<commit_message>
Updating BRK09 slides to fix arrows
</commit_message>
<xml_diff>
--- a/day-02/Day 2 - AML Bootcamp.pptx
+++ b/day-02/Day 2 - AML Bootcamp.pptx
@@ -14717,7 +14717,7 @@
           <a:p>
             <a:fld id="{5D14382E-D6CB-4C38-841B-11C21C268CEE}" type="datetimeFigureOut">
               <a:rPr lang="en-US" smtClean="0"/>
-              <a:t>9/21/2021</a:t>
+              <a:t>9/23/2021</a:t>
             </a:fld>
             <a:endParaRPr lang="en-US"/>
           </a:p>
@@ -15095,7 +15095,7 @@
                 <a:tabLst/>
                 <a:defRPr/>
               </a:pPr>
-              <a:t>9/21/2021 2:09 PM</a:t>
+              <a:t>9/23/2021 7:48 PM</a:t>
             </a:fld>
             <a:endParaRPr kumimoji="0" lang="en-US" sz="1800" b="0" i="0" u="none" strike="noStrike" kern="0" cap="none" spc="0" normalizeH="0" baseline="0" noProof="0" dirty="0">
               <a:ln>
@@ -16978,7 +16978,7 @@
           <a:p>
             <a:fld id="{32704DA2-290B-4674-B0FD-7AA1254B4ACF}" type="datetimeFigureOut">
               <a:rPr lang="en-US" smtClean="0"/>
-              <a:t>9/21/2021</a:t>
+              <a:t>9/23/2021</a:t>
             </a:fld>
             <a:endParaRPr lang="en-US"/>
           </a:p>
@@ -17176,7 +17176,7 @@
           <a:p>
             <a:fld id="{32704DA2-290B-4674-B0FD-7AA1254B4ACF}" type="datetimeFigureOut">
               <a:rPr lang="en-US" smtClean="0"/>
-              <a:t>9/21/2021</a:t>
+              <a:t>9/23/2021</a:t>
             </a:fld>
             <a:endParaRPr lang="en-US"/>
           </a:p>
@@ -17384,7 +17384,7 @@
           <a:p>
             <a:fld id="{32704DA2-290B-4674-B0FD-7AA1254B4ACF}" type="datetimeFigureOut">
               <a:rPr lang="en-US" smtClean="0"/>
-              <a:t>9/21/2021</a:t>
+              <a:t>9/23/2021</a:t>
             </a:fld>
             <a:endParaRPr lang="en-US"/>
           </a:p>
@@ -17786,7 +17786,7 @@
           <a:p>
             <a:fld id="{32704DA2-290B-4674-B0FD-7AA1254B4ACF}" type="datetimeFigureOut">
               <a:rPr lang="en-US" smtClean="0"/>
-              <a:t>9/21/2021</a:t>
+              <a:t>9/23/2021</a:t>
             </a:fld>
             <a:endParaRPr lang="en-US"/>
           </a:p>
@@ -18061,7 +18061,7 @@
           <a:p>
             <a:fld id="{32704DA2-290B-4674-B0FD-7AA1254B4ACF}" type="datetimeFigureOut">
               <a:rPr lang="en-US" smtClean="0"/>
-              <a:t>9/21/2021</a:t>
+              <a:t>9/23/2021</a:t>
             </a:fld>
             <a:endParaRPr lang="en-US"/>
           </a:p>
@@ -18326,7 +18326,7 @@
           <a:p>
             <a:fld id="{32704DA2-290B-4674-B0FD-7AA1254B4ACF}" type="datetimeFigureOut">
               <a:rPr lang="en-US" smtClean="0"/>
-              <a:t>9/21/2021</a:t>
+              <a:t>9/23/2021</a:t>
             </a:fld>
             <a:endParaRPr lang="en-US"/>
           </a:p>
@@ -18738,7 +18738,7 @@
           <a:p>
             <a:fld id="{32704DA2-290B-4674-B0FD-7AA1254B4ACF}" type="datetimeFigureOut">
               <a:rPr lang="en-US" smtClean="0"/>
-              <a:t>9/21/2021</a:t>
+              <a:t>9/23/2021</a:t>
             </a:fld>
             <a:endParaRPr lang="en-US"/>
           </a:p>
@@ -18879,7 +18879,7 @@
           <a:p>
             <a:fld id="{32704DA2-290B-4674-B0FD-7AA1254B4ACF}" type="datetimeFigureOut">
               <a:rPr lang="en-US" smtClean="0"/>
-              <a:t>9/21/2021</a:t>
+              <a:t>9/23/2021</a:t>
             </a:fld>
             <a:endParaRPr lang="en-US"/>
           </a:p>
@@ -18992,7 +18992,7 @@
           <a:p>
             <a:fld id="{32704DA2-290B-4674-B0FD-7AA1254B4ACF}" type="datetimeFigureOut">
               <a:rPr lang="en-US" smtClean="0"/>
-              <a:t>9/21/2021</a:t>
+              <a:t>9/23/2021</a:t>
             </a:fld>
             <a:endParaRPr lang="en-US"/>
           </a:p>
@@ -19303,7 +19303,7 @@
           <a:p>
             <a:fld id="{32704DA2-290B-4674-B0FD-7AA1254B4ACF}" type="datetimeFigureOut">
               <a:rPr lang="en-US" smtClean="0"/>
-              <a:t>9/21/2021</a:t>
+              <a:t>9/23/2021</a:t>
             </a:fld>
             <a:endParaRPr lang="en-US"/>
           </a:p>
@@ -19591,7 +19591,7 @@
           <a:p>
             <a:fld id="{32704DA2-290B-4674-B0FD-7AA1254B4ACF}" type="datetimeFigureOut">
               <a:rPr lang="en-US" smtClean="0"/>
-              <a:t>9/21/2021</a:t>
+              <a:t>9/23/2021</a:t>
             </a:fld>
             <a:endParaRPr lang="en-US"/>
           </a:p>
@@ -19832,7 +19832,7 @@
           <a:p>
             <a:fld id="{32704DA2-290B-4674-B0FD-7AA1254B4ACF}" type="datetimeFigureOut">
               <a:rPr lang="en-US" smtClean="0"/>
-              <a:t>9/21/2021</a:t>
+              <a:t>9/23/2021</a:t>
             </a:fld>
             <a:endParaRPr lang="en-US"/>
           </a:p>
@@ -28083,7 +28083,7 @@
         </p:nvSpPr>
         <p:spPr>
           <a:xfrm>
-            <a:off x="7564316" y="679939"/>
+            <a:off x="7405190" y="1400331"/>
             <a:ext cx="3200400" cy="1125415"/>
           </a:xfrm>
           <a:prstGeom prst="wedgeRectCallout">
@@ -28135,7 +28135,7 @@
         </p:nvSpPr>
         <p:spPr>
           <a:xfrm>
-            <a:off x="8447942" y="994271"/>
+            <a:off x="8252633" y="1501897"/>
             <a:ext cx="3200400" cy="1125415"/>
           </a:xfrm>
           <a:prstGeom prst="wedgeRectCallout">
@@ -28187,7 +28187,7 @@
         </p:nvSpPr>
         <p:spPr>
           <a:xfrm>
-            <a:off x="8500871" y="3429000"/>
+            <a:off x="8589648" y="4121459"/>
             <a:ext cx="3222205" cy="1547004"/>
           </a:xfrm>
           <a:prstGeom prst="wedgeRectCallout">
@@ -28244,7 +28244,7 @@
         </p:nvSpPr>
         <p:spPr>
           <a:xfrm>
-            <a:off x="4258056" y="4197303"/>
+            <a:off x="4204790" y="4894961"/>
             <a:ext cx="3200400" cy="1125415"/>
           </a:xfrm>
           <a:prstGeom prst="wedgeRectCallout">
@@ -29147,7 +29147,7 @@
         </p:nvSpPr>
         <p:spPr>
           <a:xfrm>
-            <a:off x="6778517" y="4197303"/>
+            <a:off x="6645352" y="4774352"/>
             <a:ext cx="3397114" cy="1125415"/>
           </a:xfrm>
           <a:prstGeom prst="wedgeRectCallout">
@@ -29489,7 +29489,7 @@
         </p:nvSpPr>
         <p:spPr>
           <a:xfrm>
-            <a:off x="5858256" y="3429000"/>
+            <a:off x="5858256" y="4094826"/>
             <a:ext cx="3397114" cy="1576754"/>
           </a:xfrm>
           <a:prstGeom prst="wedgeRectCallout">
@@ -30090,7 +30090,7 @@
         </p:nvSpPr>
         <p:spPr>
           <a:xfrm>
-            <a:off x="6831272" y="574484"/>
+            <a:off x="7035459" y="1653650"/>
             <a:ext cx="3397114" cy="1576754"/>
           </a:xfrm>
           <a:prstGeom prst="wedgeRectCallout">
@@ -30142,7 +30142,7 @@
         </p:nvSpPr>
         <p:spPr>
           <a:xfrm>
-            <a:off x="7275107" y="902677"/>
+            <a:off x="7718942" y="1583505"/>
             <a:ext cx="3397114" cy="1893394"/>
           </a:xfrm>
           <a:prstGeom prst="wedgeRectCallout">
@@ -30194,7 +30194,7 @@
         </p:nvSpPr>
         <p:spPr>
           <a:xfrm>
-            <a:off x="7440872" y="4461462"/>
+            <a:off x="8550581" y="4253938"/>
             <a:ext cx="3397114" cy="1020557"/>
           </a:xfrm>
           <a:prstGeom prst="wedgeRectCallout">
@@ -30246,13 +30246,13 @@
         </p:nvSpPr>
         <p:spPr>
           <a:xfrm>
-            <a:off x="7569826" y="5557751"/>
+            <a:off x="7956686" y="5607640"/>
             <a:ext cx="3397114" cy="1020557"/>
           </a:xfrm>
           <a:prstGeom prst="wedgeRectCallout">
             <a:avLst>
-              <a:gd name="adj1" fmla="val -105862"/>
-              <a:gd name="adj2" fmla="val -35301"/>
+              <a:gd name="adj1" fmla="val -102987"/>
+              <a:gd name="adj2" fmla="val 25591"/>
             </a:avLst>
           </a:prstGeom>
         </p:spPr>
@@ -31015,7 +31015,7 @@
         </p:nvSpPr>
         <p:spPr>
           <a:xfrm>
-            <a:off x="8484226" y="1773914"/>
+            <a:off x="8484226" y="2563410"/>
             <a:ext cx="3397114" cy="1576754"/>
           </a:xfrm>
           <a:prstGeom prst="wedgeRectCallout">
@@ -31075,7 +31075,7 @@
         </p:nvSpPr>
         <p:spPr>
           <a:xfrm>
-            <a:off x="8484226" y="1853755"/>
+            <a:off x="7956686" y="2440216"/>
             <a:ext cx="3397114" cy="1217691"/>
           </a:xfrm>
           <a:prstGeom prst="wedgeRectCallout">
@@ -31127,13 +31127,13 @@
         </p:nvSpPr>
         <p:spPr>
           <a:xfrm>
-            <a:off x="8194430" y="5276013"/>
+            <a:off x="7883712" y="4001294"/>
             <a:ext cx="3397114" cy="1154127"/>
           </a:xfrm>
           <a:prstGeom prst="wedgeRectCallout">
             <a:avLst>
-              <a:gd name="adj1" fmla="val -73769"/>
-              <a:gd name="adj2" fmla="val -52745"/>
+              <a:gd name="adj1" fmla="val -39796"/>
+              <a:gd name="adj2" fmla="val 78021"/>
             </a:avLst>
           </a:prstGeom>
         </p:spPr>
@@ -31179,7 +31179,7 @@
         </p:nvSpPr>
         <p:spPr>
           <a:xfrm>
-            <a:off x="8132533" y="3442504"/>
+            <a:off x="8075558" y="3953176"/>
             <a:ext cx="3397114" cy="1362389"/>
           </a:xfrm>
           <a:prstGeom prst="wedgeRectCallout">
@@ -32006,7 +32006,7 @@
         </p:nvSpPr>
         <p:spPr>
           <a:xfrm>
-            <a:off x="8325962" y="1714429"/>
+            <a:off x="8325962" y="1707808"/>
             <a:ext cx="3397114" cy="1405423"/>
           </a:xfrm>
           <a:prstGeom prst="wedgeRectCallout">
@@ -32904,7 +32904,7 @@
         </p:nvSpPr>
         <p:spPr>
           <a:xfrm>
-            <a:off x="8613180" y="568367"/>
+            <a:off x="8417871" y="1234112"/>
             <a:ext cx="3397114" cy="1448001"/>
           </a:xfrm>
           <a:prstGeom prst="wedgeRectCallout">
@@ -32956,7 +32956,7 @@
         </p:nvSpPr>
         <p:spPr>
           <a:xfrm>
-            <a:off x="8753853" y="2908081"/>
+            <a:off x="8665077" y="3508443"/>
             <a:ext cx="3397114" cy="1595761"/>
           </a:xfrm>
           <a:prstGeom prst="wedgeRectCallout">
@@ -33008,13 +33008,13 @@
         </p:nvSpPr>
         <p:spPr>
           <a:xfrm>
-            <a:off x="6096000" y="5237029"/>
+            <a:off x="6966520" y="5559215"/>
             <a:ext cx="3397114" cy="1154127"/>
           </a:xfrm>
           <a:prstGeom prst="wedgeRectCallout">
             <a:avLst>
-              <a:gd name="adj1" fmla="val -68593"/>
-              <a:gd name="adj2" fmla="val -61887"/>
+              <a:gd name="adj1" fmla="val -73820"/>
+              <a:gd name="adj2" fmla="val -47272"/>
             </a:avLst>
           </a:prstGeom>
         </p:spPr>
@@ -33060,7 +33060,7 @@
         </p:nvSpPr>
         <p:spPr>
           <a:xfrm>
-            <a:off x="8194430" y="4261499"/>
+            <a:off x="8514026" y="4966151"/>
             <a:ext cx="3397114" cy="1362389"/>
           </a:xfrm>
           <a:prstGeom prst="wedgeRectCallout">
@@ -33925,7 +33925,7 @@
         </p:nvSpPr>
         <p:spPr>
           <a:xfrm>
-            <a:off x="8613180" y="2704999"/>
+            <a:off x="8524403" y="3393632"/>
             <a:ext cx="3397114" cy="1448001"/>
           </a:xfrm>
           <a:prstGeom prst="wedgeRectCallout">
@@ -33982,8 +33982,8 @@
           </a:xfrm>
           <a:prstGeom prst="wedgeRectCallout">
             <a:avLst>
-              <a:gd name="adj1" fmla="val -89298"/>
-              <a:gd name="adj2" fmla="val -75866"/>
+              <a:gd name="adj1" fmla="val -84855"/>
+              <a:gd name="adj2" fmla="val -43125"/>
             </a:avLst>
           </a:prstGeom>
         </p:spPr>
@@ -34555,18 +34555,7 @@
               <a:rPr lang="en-US" sz="2400" dirty="0">
                 <a:latin typeface="Consolas" panose="020B0609020204030204" pitchFamily="49" charset="0"/>
               </a:rPr>
-              <a:t>,</a:t>
-            </a:r>
-          </a:p>
-          <a:p>
-            <a:pPr marL="0" indent="0">
-              <a:buNone/>
-            </a:pPr>
-            <a:r>
-              <a:rPr lang="en-US" sz="2400" dirty="0">
-                <a:latin typeface="Consolas" panose="020B0609020204030204" pitchFamily="49" charset="0"/>
-              </a:rPr>
-              <a:t>    </a:t>
+              <a:t>, </a:t>
             </a:r>
             <a:r>
               <a:rPr lang="en-US" sz="2400" dirty="0" err="1">
@@ -34609,7 +34598,7 @@
         </p:nvSpPr>
         <p:spPr>
           <a:xfrm>
-            <a:off x="7909794" y="855836"/>
+            <a:off x="8070987" y="1822647"/>
             <a:ext cx="3397114" cy="1576754"/>
           </a:xfrm>
           <a:prstGeom prst="wedgeRectCallout">
@@ -34661,7 +34650,7 @@
         </p:nvSpPr>
         <p:spPr>
           <a:xfrm>
-            <a:off x="7685412" y="902677"/>
+            <a:off x="8185287" y="1615537"/>
             <a:ext cx="3397114" cy="1893394"/>
           </a:xfrm>
           <a:prstGeom prst="wedgeRectCallout">
@@ -34713,13 +34702,13 @@
         </p:nvSpPr>
         <p:spPr>
           <a:xfrm>
-            <a:off x="8413887" y="4461462"/>
+            <a:off x="8618074" y="2998652"/>
             <a:ext cx="3397114" cy="1020557"/>
           </a:xfrm>
           <a:prstGeom prst="wedgeRectCallout">
             <a:avLst>
-              <a:gd name="adj1" fmla="val -76529"/>
-              <a:gd name="adj2" fmla="val -29557"/>
+              <a:gd name="adj1" fmla="val -80710"/>
+              <a:gd name="adj2" fmla="val 64390"/>
             </a:avLst>
           </a:prstGeom>
         </p:spPr>
@@ -34765,13 +34754,13 @@
         </p:nvSpPr>
         <p:spPr>
           <a:xfrm>
-            <a:off x="8413887" y="4946318"/>
+            <a:off x="8529296" y="4415749"/>
             <a:ext cx="3397114" cy="1893394"/>
           </a:xfrm>
           <a:prstGeom prst="wedgeRectCallout">
             <a:avLst>
-              <a:gd name="adj1" fmla="val -134159"/>
-              <a:gd name="adj2" fmla="val -23683"/>
+              <a:gd name="adj1" fmla="val -150361"/>
+              <a:gd name="adj2" fmla="val 44304"/>
             </a:avLst>
           </a:prstGeom>
         </p:spPr>
@@ -35625,7 +35614,7 @@
         </p:nvSpPr>
         <p:spPr>
           <a:xfrm>
-            <a:off x="8032886" y="1911682"/>
+            <a:off x="7873088" y="2640623"/>
             <a:ext cx="3397114" cy="1576754"/>
           </a:xfrm>
           <a:prstGeom prst="wedgeRectCallout">
@@ -35677,7 +35666,7 @@
         </p:nvSpPr>
         <p:spPr>
           <a:xfrm>
-            <a:off x="8022452" y="1512277"/>
+            <a:off x="8111229" y="2266879"/>
             <a:ext cx="3569092" cy="2134479"/>
           </a:xfrm>
           <a:prstGeom prst="wedgeRectCallout">
@@ -36144,7 +36133,7 @@
         </p:nvSpPr>
         <p:spPr>
           <a:xfrm>
-            <a:off x="8472503" y="1646890"/>
+            <a:off x="8472503" y="2341833"/>
             <a:ext cx="3397114" cy="1016307"/>
           </a:xfrm>
           <a:prstGeom prst="wedgeRectCallout">
@@ -36196,7 +36185,7 @@
         </p:nvSpPr>
         <p:spPr>
           <a:xfrm>
-            <a:off x="8472503" y="1649342"/>
+            <a:off x="8472503" y="2409107"/>
             <a:ext cx="3397114" cy="1898067"/>
           </a:xfrm>
           <a:prstGeom prst="wedgeRectCallout">
@@ -36248,7 +36237,7 @@
         </p:nvSpPr>
         <p:spPr>
           <a:xfrm>
-            <a:off x="7929958" y="4527463"/>
+            <a:off x="7885569" y="5211110"/>
             <a:ext cx="3397114" cy="1362389"/>
           </a:xfrm>
           <a:prstGeom prst="wedgeRectCallout">
@@ -42729,7 +42718,7 @@
         </p:nvSpPr>
         <p:spPr>
           <a:xfrm>
-            <a:off x="8472503" y="1600756"/>
+            <a:off x="8543524" y="2252800"/>
             <a:ext cx="3397114" cy="1448001"/>
           </a:xfrm>
           <a:prstGeom prst="wedgeRectCallout">
@@ -42781,7 +42770,7 @@
         </p:nvSpPr>
         <p:spPr>
           <a:xfrm>
-            <a:off x="8472503" y="2479967"/>
+            <a:off x="8250105" y="3174911"/>
             <a:ext cx="3397114" cy="1220834"/>
           </a:xfrm>
           <a:prstGeom prst="wedgeRectCallout">
@@ -42833,7 +42822,7 @@
         </p:nvSpPr>
         <p:spPr>
           <a:xfrm>
-            <a:off x="5615353" y="4904955"/>
+            <a:off x="5597598" y="5683201"/>
             <a:ext cx="3397114" cy="1154127"/>
           </a:xfrm>
           <a:prstGeom prst="wedgeRectCallout">
@@ -42885,7 +42874,7 @@
         </p:nvSpPr>
         <p:spPr>
           <a:xfrm>
-            <a:off x="7596557" y="4398760"/>
+            <a:off x="7718942" y="5063836"/>
             <a:ext cx="3397114" cy="1362389"/>
           </a:xfrm>
           <a:prstGeom prst="wedgeRectCallout">

</xml_diff>